<commit_message>
Adiciona exercicio aula 1 - desenvolvimento interface
</commit_message>
<xml_diff>
--- a/Desenvolvimento de Interface de Usuário.pptx
+++ b/Desenvolvimento de Interface de Usuário.pptx
@@ -5,7 +5,7 @@
     <p:sldMasterId id="2147483659" r:id="rId1"/>
   </p:sldMasterIdLst>
   <p:notesMasterIdLst>
-    <p:notesMasterId r:id="rId9"/>
+    <p:notesMasterId r:id="rId10"/>
   </p:notesMasterIdLst>
   <p:sldIdLst>
     <p:sldId id="256" r:id="rId2"/>
@@ -15,30 +15,31 @@
     <p:sldId id="285" r:id="rId6"/>
     <p:sldId id="284" r:id="rId7"/>
     <p:sldId id="274" r:id="rId8"/>
+    <p:sldId id="286" r:id="rId9"/>
   </p:sldIdLst>
   <p:sldSz cx="9144000" cy="5715000" type="screen16x10"/>
   <p:notesSz cx="6858000" cy="9144000"/>
   <p:embeddedFontLst>
     <p:embeddedFont>
       <p:font typeface="Ubuntu" panose="020B0504030602030204" pitchFamily="34" charset="0"/>
-      <p:regular r:id="rId10"/>
-      <p:bold r:id="rId11"/>
-      <p:italic r:id="rId12"/>
-      <p:boldItalic r:id="rId13"/>
+      <p:regular r:id="rId11"/>
+      <p:bold r:id="rId12"/>
+      <p:italic r:id="rId13"/>
+      <p:boldItalic r:id="rId14"/>
     </p:embeddedFont>
     <p:embeddedFont>
       <p:font typeface="Ubuntu Light" panose="020B0304030602030204" pitchFamily="34" charset="0"/>
-      <p:regular r:id="rId14"/>
-      <p:bold r:id="rId15"/>
-      <p:italic r:id="rId16"/>
-      <p:boldItalic r:id="rId17"/>
+      <p:regular r:id="rId15"/>
+      <p:bold r:id="rId16"/>
+      <p:italic r:id="rId17"/>
+      <p:boldItalic r:id="rId18"/>
     </p:embeddedFont>
     <p:embeddedFont>
       <p:font typeface="Ubuntu Medium" panose="020B0604030602030204" pitchFamily="34" charset="0"/>
-      <p:regular r:id="rId18"/>
-      <p:bold r:id="rId19"/>
-      <p:italic r:id="rId20"/>
-      <p:boldItalic r:id="rId21"/>
+      <p:regular r:id="rId19"/>
+      <p:bold r:id="rId20"/>
+      <p:italic r:id="rId21"/>
+      <p:boldItalic r:id="rId22"/>
     </p:embeddedFont>
   </p:embeddedFontLst>
   <p:defaultTextStyle>
@@ -1471,6 +1472,115 @@
         </p:txBody>
       </p:sp>
     </p:spTree>
+  </p:cSld>
+  <p:clrMapOvr>
+    <a:masterClrMapping/>
+  </p:clrMapOvr>
+</p:notes>
+</file>
+
+<file path=ppt/notesSlides/notesSlide8.xml><?xml version="1.0" encoding="utf-8"?>
+<p:notes xmlns:a="http://schemas.openxmlformats.org/drawingml/2006/main" xmlns:r="http://schemas.openxmlformats.org/officeDocument/2006/relationships" xmlns:p="http://schemas.openxmlformats.org/presentationml/2006/main" showMasterSp="0" showMasterPhAnim="0">
+  <p:cSld>
+    <p:spTree>
+      <p:nvGrpSpPr>
+        <p:cNvPr id="1" name="Shape 69"/>
+        <p:cNvGrpSpPr/>
+        <p:nvPr/>
+      </p:nvGrpSpPr>
+      <p:grpSpPr>
+        <a:xfrm>
+          <a:off x="0" y="0"/>
+          <a:ext cx="0" cy="0"/>
+          <a:chOff x="0" y="0"/>
+          <a:chExt cx="0" cy="0"/>
+        </a:xfrm>
+      </p:grpSpPr>
+      <p:sp>
+        <p:nvSpPr>
+          <p:cNvPr id="70" name="Google Shape;70;ga964336a16_0_40:notes"/>
+          <p:cNvSpPr>
+            <a:spLocks noGrp="1" noRot="1" noChangeAspect="1"/>
+          </p:cNvSpPr>
+          <p:nvPr>
+            <p:ph type="sldImg" idx="2"/>
+          </p:nvPr>
+        </p:nvSpPr>
+        <p:spPr>
+          <a:xfrm>
+            <a:off x="685800" y="685800"/>
+            <a:ext cx="5486400" cy="3429000"/>
+          </a:xfrm>
+          <a:custGeom>
+            <a:avLst/>
+            <a:gdLst/>
+            <a:ahLst/>
+            <a:cxnLst/>
+            <a:rect l="l" t="t" r="r" b="b"/>
+            <a:pathLst>
+              <a:path w="120000" h="120000" extrusionOk="0">
+                <a:moveTo>
+                  <a:pt x="0" y="0"/>
+                </a:moveTo>
+                <a:lnTo>
+                  <a:pt x="120000" y="0"/>
+                </a:lnTo>
+                <a:lnTo>
+                  <a:pt x="120000" y="120000"/>
+                </a:lnTo>
+                <a:lnTo>
+                  <a:pt x="0" y="120000"/>
+                </a:lnTo>
+                <a:close/>
+              </a:path>
+            </a:pathLst>
+          </a:custGeom>
+        </p:spPr>
+      </p:sp>
+      <p:sp>
+        <p:nvSpPr>
+          <p:cNvPr id="71" name="Google Shape;71;ga964336a16_0_40:notes"/>
+          <p:cNvSpPr txBox="1">
+            <a:spLocks noGrp="1"/>
+          </p:cNvSpPr>
+          <p:nvPr>
+            <p:ph type="body" idx="1"/>
+          </p:nvPr>
+        </p:nvSpPr>
+        <p:spPr>
+          <a:xfrm>
+            <a:off x="685800" y="4343400"/>
+            <a:ext cx="5486400" cy="4114800"/>
+          </a:xfrm>
+          <a:prstGeom prst="rect">
+            <a:avLst/>
+          </a:prstGeom>
+        </p:spPr>
+        <p:txBody>
+          <a:bodyPr spcFirstLastPara="1" wrap="square" lIns="91425" tIns="91425" rIns="91425" bIns="91425" anchor="t" anchorCtr="0">
+            <a:noAutofit/>
+          </a:bodyPr>
+          <a:lstStyle/>
+          <a:p>
+            <a:pPr marL="0" lvl="0" indent="0" algn="l" rtl="0">
+              <a:spcBef>
+                <a:spcPts val="0"/>
+              </a:spcBef>
+              <a:spcAft>
+                <a:spcPts val="0"/>
+              </a:spcAft>
+              <a:buNone/>
+            </a:pPr>
+            <a:endParaRPr dirty="0"/>
+          </a:p>
+        </p:txBody>
+      </p:sp>
+    </p:spTree>
+    <p:extLst>
+      <p:ext uri="{BB962C8B-B14F-4D97-AF65-F5344CB8AC3E}">
+        <p14:creationId xmlns:p14="http://schemas.microsoft.com/office/powerpoint/2010/main" val="1842831489"/>
+      </p:ext>
+    </p:extLst>
   </p:cSld>
   <p:clrMapOvr>
     <a:masterClrMapping/>
@@ -7421,15 +7531,33 @@
                                   </p:childTnLst>
                                 </p:cTn>
                               </p:par>
+                            </p:childTnLst>
+                          </p:cTn>
+                        </p:par>
+                      </p:childTnLst>
+                    </p:cTn>
+                  </p:par>
+                  <p:par>
+                    <p:cTn id="8" fill="hold">
+                      <p:stCondLst>
+                        <p:cond delay="indefinite"/>
+                      </p:stCondLst>
+                      <p:childTnLst>
+                        <p:par>
+                          <p:cTn id="9" fill="hold">
+                            <p:stCondLst>
+                              <p:cond delay="0"/>
+                            </p:stCondLst>
+                            <p:childTnLst>
                               <p:par>
-                                <p:cTn id="8" presetID="10" presetClass="entr" presetSubtype="0" fill="hold" grpId="0" nodeType="withEffect">
+                                <p:cTn id="10" presetID="10" presetClass="entr" presetSubtype="0" fill="hold" grpId="0" nodeType="clickEffect">
                                   <p:stCondLst>
                                     <p:cond delay="0"/>
                                   </p:stCondLst>
                                   <p:childTnLst>
                                     <p:set>
                                       <p:cBhvr>
-                                        <p:cTn id="9" dur="1" fill="hold">
+                                        <p:cTn id="11" dur="1" fill="hold">
                                           <p:stCondLst>
                                             <p:cond delay="0"/>
                                           </p:stCondLst>
@@ -7451,7 +7579,7 @@
                                     </p:set>
                                     <p:animEffect transition="in" filter="fade">
                                       <p:cBhvr>
-                                        <p:cTn id="10" dur="500"/>
+                                        <p:cTn id="12" dur="500"/>
                                         <p:tgtEl>
                                           <p:spTgt spid="74">
                                             <p:txEl>
@@ -7464,15 +7592,33 @@
                                   </p:childTnLst>
                                 </p:cTn>
                               </p:par>
+                            </p:childTnLst>
+                          </p:cTn>
+                        </p:par>
+                      </p:childTnLst>
+                    </p:cTn>
+                  </p:par>
+                  <p:par>
+                    <p:cTn id="13" fill="hold">
+                      <p:stCondLst>
+                        <p:cond delay="indefinite"/>
+                      </p:stCondLst>
+                      <p:childTnLst>
+                        <p:par>
+                          <p:cTn id="14" fill="hold">
+                            <p:stCondLst>
+                              <p:cond delay="0"/>
+                            </p:stCondLst>
+                            <p:childTnLst>
                               <p:par>
-                                <p:cTn id="11" presetID="10" presetClass="entr" presetSubtype="0" fill="hold" grpId="0" nodeType="withEffect">
+                                <p:cTn id="15" presetID="10" presetClass="entr" presetSubtype="0" fill="hold" grpId="0" nodeType="clickEffect">
                                   <p:stCondLst>
                                     <p:cond delay="0"/>
                                   </p:stCondLst>
                                   <p:childTnLst>
                                     <p:set>
                                       <p:cBhvr>
-                                        <p:cTn id="12" dur="1" fill="hold">
+                                        <p:cTn id="16" dur="1" fill="hold">
                                           <p:stCondLst>
                                             <p:cond delay="0"/>
                                           </p:stCondLst>
@@ -7494,7 +7640,7 @@
                                     </p:set>
                                     <p:animEffect transition="in" filter="fade">
                                       <p:cBhvr>
-                                        <p:cTn id="13" dur="500"/>
+                                        <p:cTn id="17" dur="500"/>
                                         <p:tgtEl>
                                           <p:spTgt spid="74">
                                             <p:txEl>
@@ -7514,26 +7660,26 @@
                     </p:cTn>
                   </p:par>
                   <p:par>
-                    <p:cTn id="14" fill="hold">
+                    <p:cTn id="18" fill="hold">
                       <p:stCondLst>
                         <p:cond delay="indefinite"/>
                       </p:stCondLst>
                       <p:childTnLst>
                         <p:par>
-                          <p:cTn id="15" fill="hold">
+                          <p:cTn id="19" fill="hold">
                             <p:stCondLst>
                               <p:cond delay="0"/>
                             </p:stCondLst>
                             <p:childTnLst>
                               <p:par>
-                                <p:cTn id="16" presetID="10" presetClass="entr" presetSubtype="0" fill="hold" grpId="0" nodeType="clickEffect">
+                                <p:cTn id="20" presetID="10" presetClass="entr" presetSubtype="0" fill="hold" grpId="0" nodeType="clickEffect">
                                   <p:stCondLst>
                                     <p:cond delay="0"/>
                                   </p:stCondLst>
                                   <p:childTnLst>
                                     <p:set>
                                       <p:cBhvr>
-                                        <p:cTn id="17" dur="1" fill="hold">
+                                        <p:cTn id="21" dur="1" fill="hold">
                                           <p:stCondLst>
                                             <p:cond delay="0"/>
                                           </p:stCondLst>
@@ -7555,7 +7701,7 @@
                                     </p:set>
                                     <p:animEffect transition="in" filter="fade">
                                       <p:cBhvr>
-                                        <p:cTn id="18" dur="500"/>
+                                        <p:cTn id="22" dur="500"/>
                                         <p:tgtEl>
                                           <p:spTgt spid="74">
                                             <p:txEl>
@@ -7575,26 +7721,26 @@
                     </p:cTn>
                   </p:par>
                   <p:par>
-                    <p:cTn id="19" fill="hold">
+                    <p:cTn id="23" fill="hold">
                       <p:stCondLst>
                         <p:cond delay="indefinite"/>
                       </p:stCondLst>
                       <p:childTnLst>
                         <p:par>
-                          <p:cTn id="20" fill="hold">
+                          <p:cTn id="24" fill="hold">
                             <p:stCondLst>
                               <p:cond delay="0"/>
                             </p:stCondLst>
                             <p:childTnLst>
                               <p:par>
-                                <p:cTn id="21" presetID="10" presetClass="entr" presetSubtype="0" fill="hold" grpId="0" nodeType="clickEffect">
+                                <p:cTn id="25" presetID="10" presetClass="entr" presetSubtype="0" fill="hold" grpId="0" nodeType="clickEffect">
                                   <p:stCondLst>
                                     <p:cond delay="0"/>
                                   </p:stCondLst>
                                   <p:childTnLst>
                                     <p:set>
                                       <p:cBhvr>
-                                        <p:cTn id="22" dur="1" fill="hold">
+                                        <p:cTn id="26" dur="1" fill="hold">
                                           <p:stCondLst>
                                             <p:cond delay="0"/>
                                           </p:stCondLst>
@@ -7616,7 +7762,7 @@
                                     </p:set>
                                     <p:animEffect transition="in" filter="fade">
                                       <p:cBhvr>
-                                        <p:cTn id="23" dur="500"/>
+                                        <p:cTn id="27" dur="500"/>
                                         <p:tgtEl>
                                           <p:spTgt spid="74">
                                             <p:txEl>
@@ -7636,26 +7782,26 @@
                     </p:cTn>
                   </p:par>
                   <p:par>
-                    <p:cTn id="24" fill="hold">
+                    <p:cTn id="28" fill="hold">
                       <p:stCondLst>
                         <p:cond delay="indefinite"/>
                       </p:stCondLst>
                       <p:childTnLst>
                         <p:par>
-                          <p:cTn id="25" fill="hold">
+                          <p:cTn id="29" fill="hold">
                             <p:stCondLst>
                               <p:cond delay="0"/>
                             </p:stCondLst>
                             <p:childTnLst>
                               <p:par>
-                                <p:cTn id="26" presetID="10" presetClass="entr" presetSubtype="0" fill="hold" grpId="0" nodeType="clickEffect">
+                                <p:cTn id="30" presetID="10" presetClass="entr" presetSubtype="0" fill="hold" grpId="0" nodeType="clickEffect">
                                   <p:stCondLst>
                                     <p:cond delay="0"/>
                                   </p:stCondLst>
                                   <p:childTnLst>
                                     <p:set>
                                       <p:cBhvr>
-                                        <p:cTn id="27" dur="1" fill="hold">
+                                        <p:cTn id="31" dur="1" fill="hold">
                                           <p:stCondLst>
                                             <p:cond delay="0"/>
                                           </p:stCondLst>
@@ -7677,7 +7823,7 @@
                                     </p:set>
                                     <p:animEffect transition="in" filter="fade">
                                       <p:cBhvr>
-                                        <p:cTn id="28" dur="500"/>
+                                        <p:cTn id="32" dur="500"/>
                                         <p:tgtEl>
                                           <p:spTgt spid="74">
                                             <p:txEl>
@@ -7697,26 +7843,26 @@
                     </p:cTn>
                   </p:par>
                   <p:par>
-                    <p:cTn id="29" fill="hold">
+                    <p:cTn id="33" fill="hold">
                       <p:stCondLst>
                         <p:cond delay="indefinite"/>
                       </p:stCondLst>
                       <p:childTnLst>
                         <p:par>
-                          <p:cTn id="30" fill="hold">
+                          <p:cTn id="34" fill="hold">
                             <p:stCondLst>
                               <p:cond delay="0"/>
                             </p:stCondLst>
                             <p:childTnLst>
                               <p:par>
-                                <p:cTn id="31" presetID="10" presetClass="entr" presetSubtype="0" fill="hold" grpId="0" nodeType="clickEffect">
+                                <p:cTn id="35" presetID="10" presetClass="entr" presetSubtype="0" fill="hold" grpId="0" nodeType="clickEffect">
                                   <p:stCondLst>
                                     <p:cond delay="0"/>
                                   </p:stCondLst>
                                   <p:childTnLst>
                                     <p:set>
                                       <p:cBhvr>
-                                        <p:cTn id="32" dur="1" fill="hold">
+                                        <p:cTn id="36" dur="1" fill="hold">
                                           <p:stCondLst>
                                             <p:cond delay="0"/>
                                           </p:stCondLst>
@@ -7738,7 +7884,7 @@
                                     </p:set>
                                     <p:animEffect transition="in" filter="fade">
                                       <p:cBhvr>
-                                        <p:cTn id="33" dur="500"/>
+                                        <p:cTn id="37" dur="500"/>
                                         <p:tgtEl>
                                           <p:spTgt spid="74">
                                             <p:txEl>
@@ -7779,7 +7925,7 @@
       </p:par>
     </p:tnLst>
     <p:bldLst>
-      <p:bldP spid="74" grpId="0" build="p"/>
+      <p:bldP spid="74" grpId="0" uiExpand="1" build="p"/>
     </p:bldLst>
   </p:timing>
 </p:sld>
@@ -8813,15 +8959,33 @@
                                   </p:childTnLst>
                                 </p:cTn>
                               </p:par>
+                            </p:childTnLst>
+                          </p:cTn>
+                        </p:par>
+                      </p:childTnLst>
+                    </p:cTn>
+                  </p:par>
+                  <p:par>
+                    <p:cTn id="8" fill="hold">
+                      <p:stCondLst>
+                        <p:cond delay="indefinite"/>
+                      </p:stCondLst>
+                      <p:childTnLst>
+                        <p:par>
+                          <p:cTn id="9" fill="hold">
+                            <p:stCondLst>
+                              <p:cond delay="0"/>
+                            </p:stCondLst>
+                            <p:childTnLst>
                               <p:par>
-                                <p:cTn id="8" presetID="10" presetClass="entr" presetSubtype="0" fill="hold" nodeType="withEffect">
+                                <p:cTn id="10" presetID="10" presetClass="entr" presetSubtype="0" fill="hold" nodeType="clickEffect">
                                   <p:stCondLst>
                                     <p:cond delay="0"/>
                                   </p:stCondLst>
                                   <p:childTnLst>
                                     <p:set>
                                       <p:cBhvr>
-                                        <p:cTn id="9" dur="1" fill="hold">
+                                        <p:cTn id="11" dur="1" fill="hold">
                                           <p:stCondLst>
                                             <p:cond delay="0"/>
                                           </p:stCondLst>
@@ -8843,7 +9007,7 @@
                                     </p:set>
                                     <p:animEffect transition="in" filter="fade">
                                       <p:cBhvr>
-                                        <p:cTn id="10" dur="500"/>
+                                        <p:cTn id="12" dur="500"/>
                                         <p:tgtEl>
                                           <p:spTgt spid="74">
                                             <p:txEl>
@@ -8863,26 +9027,26 @@
                     </p:cTn>
                   </p:par>
                   <p:par>
-                    <p:cTn id="11" fill="hold">
+                    <p:cTn id="13" fill="hold">
                       <p:stCondLst>
                         <p:cond delay="indefinite"/>
                       </p:stCondLst>
                       <p:childTnLst>
                         <p:par>
-                          <p:cTn id="12" fill="hold">
+                          <p:cTn id="14" fill="hold">
                             <p:stCondLst>
                               <p:cond delay="0"/>
                             </p:stCondLst>
                             <p:childTnLst>
                               <p:par>
-                                <p:cTn id="13" presetID="10" presetClass="entr" presetSubtype="0" fill="hold" nodeType="clickEffect">
+                                <p:cTn id="15" presetID="10" presetClass="entr" presetSubtype="0" fill="hold" nodeType="clickEffect">
                                   <p:stCondLst>
                                     <p:cond delay="0"/>
                                   </p:stCondLst>
                                   <p:childTnLst>
                                     <p:set>
                                       <p:cBhvr>
-                                        <p:cTn id="14" dur="1" fill="hold">
+                                        <p:cTn id="16" dur="1" fill="hold">
                                           <p:stCondLst>
                                             <p:cond delay="0"/>
                                           </p:stCondLst>
@@ -8904,7 +9068,7 @@
                                     </p:set>
                                     <p:animEffect transition="in" filter="fade">
                                       <p:cBhvr>
-                                        <p:cTn id="15" dur="500"/>
+                                        <p:cTn id="17" dur="500"/>
                                         <p:tgtEl>
                                           <p:spTgt spid="74">
                                             <p:txEl>
@@ -8924,26 +9088,26 @@
                     </p:cTn>
                   </p:par>
                   <p:par>
-                    <p:cTn id="16" fill="hold">
+                    <p:cTn id="18" fill="hold">
                       <p:stCondLst>
                         <p:cond delay="indefinite"/>
                       </p:stCondLst>
                       <p:childTnLst>
                         <p:par>
-                          <p:cTn id="17" fill="hold">
+                          <p:cTn id="19" fill="hold">
                             <p:stCondLst>
                               <p:cond delay="0"/>
                             </p:stCondLst>
                             <p:childTnLst>
                               <p:par>
-                                <p:cTn id="18" presetID="10" presetClass="entr" presetSubtype="0" fill="hold" nodeType="clickEffect">
+                                <p:cTn id="20" presetID="10" presetClass="entr" presetSubtype="0" fill="hold" nodeType="clickEffect">
                                   <p:stCondLst>
                                     <p:cond delay="0"/>
                                   </p:stCondLst>
                                   <p:childTnLst>
                                     <p:set>
                                       <p:cBhvr>
-                                        <p:cTn id="19" dur="1" fill="hold">
+                                        <p:cTn id="21" dur="1" fill="hold">
                                           <p:stCondLst>
                                             <p:cond delay="0"/>
                                           </p:stCondLst>
@@ -8965,7 +9129,7 @@
                                     </p:set>
                                     <p:animEffect transition="in" filter="fade">
                                       <p:cBhvr>
-                                        <p:cTn id="20" dur="500"/>
+                                        <p:cTn id="22" dur="500"/>
                                         <p:tgtEl>
                                           <p:spTgt spid="74">
                                             <p:txEl>
@@ -8985,26 +9149,26 @@
                     </p:cTn>
                   </p:par>
                   <p:par>
-                    <p:cTn id="21" fill="hold">
+                    <p:cTn id="23" fill="hold">
                       <p:stCondLst>
                         <p:cond delay="indefinite"/>
                       </p:stCondLst>
                       <p:childTnLst>
                         <p:par>
-                          <p:cTn id="22" fill="hold">
+                          <p:cTn id="24" fill="hold">
                             <p:stCondLst>
                               <p:cond delay="0"/>
                             </p:stCondLst>
                             <p:childTnLst>
                               <p:par>
-                                <p:cTn id="23" presetID="10" presetClass="entr" presetSubtype="0" fill="hold" nodeType="clickEffect">
+                                <p:cTn id="25" presetID="10" presetClass="entr" presetSubtype="0" fill="hold" nodeType="clickEffect">
                                   <p:stCondLst>
                                     <p:cond delay="0"/>
                                   </p:stCondLst>
                                   <p:childTnLst>
                                     <p:set>
                                       <p:cBhvr>
-                                        <p:cTn id="24" dur="1" fill="hold">
+                                        <p:cTn id="26" dur="1" fill="hold">
                                           <p:stCondLst>
                                             <p:cond delay="0"/>
                                           </p:stCondLst>
@@ -9026,7 +9190,7 @@
                                     </p:set>
                                     <p:animEffect transition="in" filter="fade">
                                       <p:cBhvr>
-                                        <p:cTn id="25" dur="500"/>
+                                        <p:cTn id="27" dur="500"/>
                                         <p:tgtEl>
                                           <p:spTgt spid="74">
                                             <p:txEl>
@@ -9046,26 +9210,26 @@
                     </p:cTn>
                   </p:par>
                   <p:par>
-                    <p:cTn id="26" fill="hold">
+                    <p:cTn id="28" fill="hold">
                       <p:stCondLst>
                         <p:cond delay="indefinite"/>
                       </p:stCondLst>
                       <p:childTnLst>
                         <p:par>
-                          <p:cTn id="27" fill="hold">
+                          <p:cTn id="29" fill="hold">
                             <p:stCondLst>
                               <p:cond delay="0"/>
                             </p:stCondLst>
                             <p:childTnLst>
                               <p:par>
-                                <p:cTn id="28" presetID="10" presetClass="entr" presetSubtype="0" fill="hold" nodeType="clickEffect">
+                                <p:cTn id="30" presetID="10" presetClass="entr" presetSubtype="0" fill="hold" nodeType="clickEffect">
                                   <p:stCondLst>
                                     <p:cond delay="0"/>
                                   </p:stCondLst>
                                   <p:childTnLst>
                                     <p:set>
                                       <p:cBhvr>
-                                        <p:cTn id="29" dur="1" fill="hold">
+                                        <p:cTn id="31" dur="1" fill="hold">
                                           <p:stCondLst>
                                             <p:cond delay="0"/>
                                           </p:stCondLst>
@@ -9087,7 +9251,7 @@
                                     </p:set>
                                     <p:animEffect transition="in" filter="fade">
                                       <p:cBhvr>
-                                        <p:cTn id="30" dur="500"/>
+                                        <p:cTn id="32" dur="500"/>
                                         <p:tgtEl>
                                           <p:spTgt spid="74">
                                             <p:txEl>
@@ -9107,26 +9271,26 @@
                     </p:cTn>
                   </p:par>
                   <p:par>
-                    <p:cTn id="31" fill="hold">
+                    <p:cTn id="33" fill="hold">
                       <p:stCondLst>
                         <p:cond delay="indefinite"/>
                       </p:stCondLst>
                       <p:childTnLst>
                         <p:par>
-                          <p:cTn id="32" fill="hold">
+                          <p:cTn id="34" fill="hold">
                             <p:stCondLst>
                               <p:cond delay="0"/>
                             </p:stCondLst>
                             <p:childTnLst>
                               <p:par>
-                                <p:cTn id="33" presetID="10" presetClass="entr" presetSubtype="0" fill="hold" nodeType="clickEffect">
+                                <p:cTn id="35" presetID="10" presetClass="entr" presetSubtype="0" fill="hold" nodeType="clickEffect">
                                   <p:stCondLst>
                                     <p:cond delay="0"/>
                                   </p:stCondLst>
                                   <p:childTnLst>
                                     <p:set>
                                       <p:cBhvr>
-                                        <p:cTn id="34" dur="1" fill="hold">
+                                        <p:cTn id="36" dur="1" fill="hold">
                                           <p:stCondLst>
                                             <p:cond delay="0"/>
                                           </p:stCondLst>
@@ -9148,7 +9312,7 @@
                                     </p:set>
                                     <p:animEffect transition="in" filter="fade">
                                       <p:cBhvr>
-                                        <p:cTn id="35" dur="500"/>
+                                        <p:cTn id="37" dur="500"/>
                                         <p:tgtEl>
                                           <p:spTgt spid="74">
                                             <p:txEl>
@@ -9168,26 +9332,26 @@
                     </p:cTn>
                   </p:par>
                   <p:par>
-                    <p:cTn id="36" fill="hold">
+                    <p:cTn id="38" fill="hold">
                       <p:stCondLst>
                         <p:cond delay="indefinite"/>
                       </p:stCondLst>
                       <p:childTnLst>
                         <p:par>
-                          <p:cTn id="37" fill="hold">
+                          <p:cTn id="39" fill="hold">
                             <p:stCondLst>
                               <p:cond delay="0"/>
                             </p:stCondLst>
                             <p:childTnLst>
                               <p:par>
-                                <p:cTn id="38" presetID="10" presetClass="entr" presetSubtype="0" fill="hold" nodeType="clickEffect">
+                                <p:cTn id="40" presetID="10" presetClass="entr" presetSubtype="0" fill="hold" nodeType="clickEffect">
                                   <p:stCondLst>
                                     <p:cond delay="0"/>
                                   </p:stCondLst>
                                   <p:childTnLst>
                                     <p:set>
                                       <p:cBhvr>
-                                        <p:cTn id="39" dur="1" fill="hold">
+                                        <p:cTn id="41" dur="1" fill="hold">
                                           <p:stCondLst>
                                             <p:cond delay="0"/>
                                           </p:stCondLst>
@@ -9209,7 +9373,7 @@
                                     </p:set>
                                     <p:animEffect transition="in" filter="fade">
                                       <p:cBhvr>
-                                        <p:cTn id="40" dur="500"/>
+                                        <p:cTn id="42" dur="500"/>
                                         <p:tgtEl>
                                           <p:spTgt spid="74">
                                             <p:txEl>
@@ -9229,26 +9393,26 @@
                     </p:cTn>
                   </p:par>
                   <p:par>
-                    <p:cTn id="41" fill="hold">
+                    <p:cTn id="43" fill="hold">
                       <p:stCondLst>
                         <p:cond delay="indefinite"/>
                       </p:stCondLst>
                       <p:childTnLst>
                         <p:par>
-                          <p:cTn id="42" fill="hold">
+                          <p:cTn id="44" fill="hold">
                             <p:stCondLst>
                               <p:cond delay="0"/>
                             </p:stCondLst>
                             <p:childTnLst>
                               <p:par>
-                                <p:cTn id="43" presetID="10" presetClass="entr" presetSubtype="0" fill="hold" nodeType="clickEffect">
+                                <p:cTn id="45" presetID="10" presetClass="entr" presetSubtype="0" fill="hold" nodeType="clickEffect">
                                   <p:stCondLst>
                                     <p:cond delay="0"/>
                                   </p:stCondLst>
                                   <p:childTnLst>
                                     <p:set>
                                       <p:cBhvr>
-                                        <p:cTn id="44" dur="1" fill="hold">
+                                        <p:cTn id="46" dur="1" fill="hold">
                                           <p:stCondLst>
                                             <p:cond delay="0"/>
                                           </p:stCondLst>
@@ -9270,7 +9434,7 @@
                                     </p:set>
                                     <p:animEffect transition="in" filter="fade">
                                       <p:cBhvr>
-                                        <p:cTn id="45" dur="500"/>
+                                        <p:cTn id="47" dur="500"/>
                                         <p:tgtEl>
                                           <p:spTgt spid="74">
                                             <p:txEl>
@@ -9290,26 +9454,26 @@
                     </p:cTn>
                   </p:par>
                   <p:par>
-                    <p:cTn id="46" fill="hold">
+                    <p:cTn id="48" fill="hold">
                       <p:stCondLst>
                         <p:cond delay="indefinite"/>
                       </p:stCondLst>
                       <p:childTnLst>
                         <p:par>
-                          <p:cTn id="47" fill="hold">
+                          <p:cTn id="49" fill="hold">
                             <p:stCondLst>
                               <p:cond delay="0"/>
                             </p:stCondLst>
                             <p:childTnLst>
                               <p:par>
-                                <p:cTn id="48" presetID="10" presetClass="entr" presetSubtype="0" fill="hold" nodeType="clickEffect">
+                                <p:cTn id="50" presetID="10" presetClass="entr" presetSubtype="0" fill="hold" nodeType="clickEffect">
                                   <p:stCondLst>
                                     <p:cond delay="0"/>
                                   </p:stCondLst>
                                   <p:childTnLst>
                                     <p:set>
                                       <p:cBhvr>
-                                        <p:cTn id="49" dur="1" fill="hold">
+                                        <p:cTn id="51" dur="1" fill="hold">
                                           <p:stCondLst>
                                             <p:cond delay="0"/>
                                           </p:stCondLst>
@@ -9331,7 +9495,7 @@
                                     </p:set>
                                     <p:animEffect transition="in" filter="fade">
                                       <p:cBhvr>
-                                        <p:cTn id="50" dur="500"/>
+                                        <p:cTn id="52" dur="500"/>
                                         <p:tgtEl>
                                           <p:spTgt spid="74">
                                             <p:txEl>
@@ -9351,26 +9515,26 @@
                     </p:cTn>
                   </p:par>
                   <p:par>
-                    <p:cTn id="51" fill="hold">
+                    <p:cTn id="53" fill="hold">
                       <p:stCondLst>
                         <p:cond delay="indefinite"/>
                       </p:stCondLst>
                       <p:childTnLst>
                         <p:par>
-                          <p:cTn id="52" fill="hold">
+                          <p:cTn id="54" fill="hold">
                             <p:stCondLst>
                               <p:cond delay="0"/>
                             </p:stCondLst>
                             <p:childTnLst>
                               <p:par>
-                                <p:cTn id="53" presetID="10" presetClass="entr" presetSubtype="0" fill="hold" nodeType="clickEffect">
+                                <p:cTn id="55" presetID="10" presetClass="entr" presetSubtype="0" fill="hold" nodeType="clickEffect">
                                   <p:stCondLst>
                                     <p:cond delay="0"/>
                                   </p:stCondLst>
                                   <p:childTnLst>
                                     <p:set>
                                       <p:cBhvr>
-                                        <p:cTn id="54" dur="1" fill="hold">
+                                        <p:cTn id="56" dur="1" fill="hold">
                                           <p:stCondLst>
                                             <p:cond delay="0"/>
                                           </p:stCondLst>
@@ -9392,7 +9556,7 @@
                                     </p:set>
                                     <p:animEffect transition="in" filter="fade">
                                       <p:cBhvr>
-                                        <p:cTn id="55" dur="500"/>
+                                        <p:cTn id="57" dur="500"/>
                                         <p:tgtEl>
                                           <p:spTgt spid="74">
                                             <p:txEl>
@@ -9761,6 +9925,845 @@
     <p:extLst>
       <p:ext uri="{BB962C8B-B14F-4D97-AF65-F5344CB8AC3E}">
         <p14:creationId xmlns:p14="http://schemas.microsoft.com/office/powerpoint/2010/main" val="2961602028"/>
+      </p:ext>
+    </p:extLst>
+  </p:cSld>
+  <p:clrMapOvr>
+    <a:masterClrMapping/>
+  </p:clrMapOvr>
+  <p:timing>
+    <p:tnLst>
+      <p:par>
+        <p:cTn id="1" dur="indefinite" restart="never" nodeType="tmRoot">
+          <p:childTnLst>
+            <p:seq concurrent="1" nextAc="seek">
+              <p:cTn id="2" dur="indefinite" nodeType="mainSeq">
+                <p:childTnLst>
+                  <p:par>
+                    <p:cTn id="3" fill="hold">
+                      <p:stCondLst>
+                        <p:cond delay="indefinite"/>
+                        <p:cond evt="onBegin" delay="0">
+                          <p:tn val="2"/>
+                        </p:cond>
+                      </p:stCondLst>
+                      <p:childTnLst>
+                        <p:par>
+                          <p:cTn id="4" fill="hold">
+                            <p:stCondLst>
+                              <p:cond delay="0"/>
+                            </p:stCondLst>
+                            <p:childTnLst>
+                              <p:par>
+                                <p:cTn id="5" presetID="10" presetClass="entr" presetSubtype="0" fill="hold" nodeType="withEffect">
+                                  <p:stCondLst>
+                                    <p:cond delay="0"/>
+                                  </p:stCondLst>
+                                  <p:childTnLst>
+                                    <p:set>
+                                      <p:cBhvr>
+                                        <p:cTn id="6" dur="1" fill="hold">
+                                          <p:stCondLst>
+                                            <p:cond delay="0"/>
+                                          </p:stCondLst>
+                                        </p:cTn>
+                                        <p:tgtEl>
+                                          <p:spTgt spid="74">
+                                            <p:txEl>
+                                              <p:pRg st="0" end="0"/>
+                                            </p:txEl>
+                                          </p:spTgt>
+                                        </p:tgtEl>
+                                        <p:attrNameLst>
+                                          <p:attrName>style.visibility</p:attrName>
+                                        </p:attrNameLst>
+                                      </p:cBhvr>
+                                      <p:to>
+                                        <p:strVal val="visible"/>
+                                      </p:to>
+                                    </p:set>
+                                    <p:animEffect transition="in" filter="fade">
+                                      <p:cBhvr>
+                                        <p:cTn id="7" dur="500"/>
+                                        <p:tgtEl>
+                                          <p:spTgt spid="74">
+                                            <p:txEl>
+                                              <p:pRg st="0" end="0"/>
+                                            </p:txEl>
+                                          </p:spTgt>
+                                        </p:tgtEl>
+                                      </p:cBhvr>
+                                    </p:animEffect>
+                                  </p:childTnLst>
+                                </p:cTn>
+                              </p:par>
+                            </p:childTnLst>
+                          </p:cTn>
+                        </p:par>
+                      </p:childTnLst>
+                    </p:cTn>
+                  </p:par>
+                  <p:par>
+                    <p:cTn id="8" fill="hold">
+                      <p:stCondLst>
+                        <p:cond delay="indefinite"/>
+                      </p:stCondLst>
+                      <p:childTnLst>
+                        <p:par>
+                          <p:cTn id="9" fill="hold">
+                            <p:stCondLst>
+                              <p:cond delay="0"/>
+                            </p:stCondLst>
+                            <p:childTnLst>
+                              <p:par>
+                                <p:cTn id="10" presetID="10" presetClass="entr" presetSubtype="0" fill="hold" nodeType="clickEffect">
+                                  <p:stCondLst>
+                                    <p:cond delay="0"/>
+                                  </p:stCondLst>
+                                  <p:childTnLst>
+                                    <p:set>
+                                      <p:cBhvr>
+                                        <p:cTn id="11" dur="1" fill="hold">
+                                          <p:stCondLst>
+                                            <p:cond delay="0"/>
+                                          </p:stCondLst>
+                                        </p:cTn>
+                                        <p:tgtEl>
+                                          <p:spTgt spid="74">
+                                            <p:txEl>
+                                              <p:pRg st="1" end="1"/>
+                                            </p:txEl>
+                                          </p:spTgt>
+                                        </p:tgtEl>
+                                        <p:attrNameLst>
+                                          <p:attrName>style.visibility</p:attrName>
+                                        </p:attrNameLst>
+                                      </p:cBhvr>
+                                      <p:to>
+                                        <p:strVal val="visible"/>
+                                      </p:to>
+                                    </p:set>
+                                    <p:animEffect transition="in" filter="fade">
+                                      <p:cBhvr>
+                                        <p:cTn id="12" dur="500"/>
+                                        <p:tgtEl>
+                                          <p:spTgt spid="74">
+                                            <p:txEl>
+                                              <p:pRg st="1" end="1"/>
+                                            </p:txEl>
+                                          </p:spTgt>
+                                        </p:tgtEl>
+                                      </p:cBhvr>
+                                    </p:animEffect>
+                                  </p:childTnLst>
+                                </p:cTn>
+                              </p:par>
+                            </p:childTnLst>
+                          </p:cTn>
+                        </p:par>
+                      </p:childTnLst>
+                    </p:cTn>
+                  </p:par>
+                  <p:par>
+                    <p:cTn id="13" fill="hold">
+                      <p:stCondLst>
+                        <p:cond delay="indefinite"/>
+                      </p:stCondLst>
+                      <p:childTnLst>
+                        <p:par>
+                          <p:cTn id="14" fill="hold">
+                            <p:stCondLst>
+                              <p:cond delay="0"/>
+                            </p:stCondLst>
+                            <p:childTnLst>
+                              <p:par>
+                                <p:cTn id="15" presetID="10" presetClass="entr" presetSubtype="0" fill="hold" nodeType="clickEffect">
+                                  <p:stCondLst>
+                                    <p:cond delay="0"/>
+                                  </p:stCondLst>
+                                  <p:childTnLst>
+                                    <p:set>
+                                      <p:cBhvr>
+                                        <p:cTn id="16" dur="1" fill="hold">
+                                          <p:stCondLst>
+                                            <p:cond delay="0"/>
+                                          </p:stCondLst>
+                                        </p:cTn>
+                                        <p:tgtEl>
+                                          <p:spTgt spid="74">
+                                            <p:txEl>
+                                              <p:pRg st="2" end="2"/>
+                                            </p:txEl>
+                                          </p:spTgt>
+                                        </p:tgtEl>
+                                        <p:attrNameLst>
+                                          <p:attrName>style.visibility</p:attrName>
+                                        </p:attrNameLst>
+                                      </p:cBhvr>
+                                      <p:to>
+                                        <p:strVal val="visible"/>
+                                      </p:to>
+                                    </p:set>
+                                    <p:animEffect transition="in" filter="fade">
+                                      <p:cBhvr>
+                                        <p:cTn id="17" dur="500"/>
+                                        <p:tgtEl>
+                                          <p:spTgt spid="74">
+                                            <p:txEl>
+                                              <p:pRg st="2" end="2"/>
+                                            </p:txEl>
+                                          </p:spTgt>
+                                        </p:tgtEl>
+                                      </p:cBhvr>
+                                    </p:animEffect>
+                                  </p:childTnLst>
+                                </p:cTn>
+                              </p:par>
+                            </p:childTnLst>
+                          </p:cTn>
+                        </p:par>
+                      </p:childTnLst>
+                    </p:cTn>
+                  </p:par>
+                  <p:par>
+                    <p:cTn id="18" fill="hold">
+                      <p:stCondLst>
+                        <p:cond delay="indefinite"/>
+                      </p:stCondLst>
+                      <p:childTnLst>
+                        <p:par>
+                          <p:cTn id="19" fill="hold">
+                            <p:stCondLst>
+                              <p:cond delay="0"/>
+                            </p:stCondLst>
+                            <p:childTnLst>
+                              <p:par>
+                                <p:cTn id="20" presetID="10" presetClass="entr" presetSubtype="0" fill="hold" nodeType="clickEffect">
+                                  <p:stCondLst>
+                                    <p:cond delay="0"/>
+                                  </p:stCondLst>
+                                  <p:childTnLst>
+                                    <p:set>
+                                      <p:cBhvr>
+                                        <p:cTn id="21" dur="1" fill="hold">
+                                          <p:stCondLst>
+                                            <p:cond delay="0"/>
+                                          </p:stCondLst>
+                                        </p:cTn>
+                                        <p:tgtEl>
+                                          <p:spTgt spid="74">
+                                            <p:txEl>
+                                              <p:pRg st="4" end="4"/>
+                                            </p:txEl>
+                                          </p:spTgt>
+                                        </p:tgtEl>
+                                        <p:attrNameLst>
+                                          <p:attrName>style.visibility</p:attrName>
+                                        </p:attrNameLst>
+                                      </p:cBhvr>
+                                      <p:to>
+                                        <p:strVal val="visible"/>
+                                      </p:to>
+                                    </p:set>
+                                    <p:animEffect transition="in" filter="fade">
+                                      <p:cBhvr>
+                                        <p:cTn id="22" dur="500"/>
+                                        <p:tgtEl>
+                                          <p:spTgt spid="74">
+                                            <p:txEl>
+                                              <p:pRg st="4" end="4"/>
+                                            </p:txEl>
+                                          </p:spTgt>
+                                        </p:tgtEl>
+                                      </p:cBhvr>
+                                    </p:animEffect>
+                                  </p:childTnLst>
+                                </p:cTn>
+                              </p:par>
+                            </p:childTnLst>
+                          </p:cTn>
+                        </p:par>
+                      </p:childTnLst>
+                    </p:cTn>
+                  </p:par>
+                  <p:par>
+                    <p:cTn id="23" fill="hold">
+                      <p:stCondLst>
+                        <p:cond delay="indefinite"/>
+                      </p:stCondLst>
+                      <p:childTnLst>
+                        <p:par>
+                          <p:cTn id="24" fill="hold">
+                            <p:stCondLst>
+                              <p:cond delay="0"/>
+                            </p:stCondLst>
+                            <p:childTnLst>
+                              <p:par>
+                                <p:cTn id="25" presetID="10" presetClass="entr" presetSubtype="0" fill="hold" nodeType="clickEffect">
+                                  <p:stCondLst>
+                                    <p:cond delay="0"/>
+                                  </p:stCondLst>
+                                  <p:childTnLst>
+                                    <p:set>
+                                      <p:cBhvr>
+                                        <p:cTn id="26" dur="1" fill="hold">
+                                          <p:stCondLst>
+                                            <p:cond delay="0"/>
+                                          </p:stCondLst>
+                                        </p:cTn>
+                                        <p:tgtEl>
+                                          <p:spTgt spid="74">
+                                            <p:txEl>
+                                              <p:pRg st="5" end="5"/>
+                                            </p:txEl>
+                                          </p:spTgt>
+                                        </p:tgtEl>
+                                        <p:attrNameLst>
+                                          <p:attrName>style.visibility</p:attrName>
+                                        </p:attrNameLst>
+                                      </p:cBhvr>
+                                      <p:to>
+                                        <p:strVal val="visible"/>
+                                      </p:to>
+                                    </p:set>
+                                    <p:animEffect transition="in" filter="fade">
+                                      <p:cBhvr>
+                                        <p:cTn id="27" dur="500"/>
+                                        <p:tgtEl>
+                                          <p:spTgt spid="74">
+                                            <p:txEl>
+                                              <p:pRg st="5" end="5"/>
+                                            </p:txEl>
+                                          </p:spTgt>
+                                        </p:tgtEl>
+                                      </p:cBhvr>
+                                    </p:animEffect>
+                                  </p:childTnLst>
+                                </p:cTn>
+                              </p:par>
+                            </p:childTnLst>
+                          </p:cTn>
+                        </p:par>
+                      </p:childTnLst>
+                    </p:cTn>
+                  </p:par>
+                  <p:par>
+                    <p:cTn id="28" fill="hold">
+                      <p:stCondLst>
+                        <p:cond delay="indefinite"/>
+                      </p:stCondLst>
+                      <p:childTnLst>
+                        <p:par>
+                          <p:cTn id="29" fill="hold">
+                            <p:stCondLst>
+                              <p:cond delay="0"/>
+                            </p:stCondLst>
+                            <p:childTnLst>
+                              <p:par>
+                                <p:cTn id="30" presetID="10" presetClass="entr" presetSubtype="0" fill="hold" nodeType="clickEffect">
+                                  <p:stCondLst>
+                                    <p:cond delay="0"/>
+                                  </p:stCondLst>
+                                  <p:childTnLst>
+                                    <p:set>
+                                      <p:cBhvr>
+                                        <p:cTn id="31" dur="1" fill="hold">
+                                          <p:stCondLst>
+                                            <p:cond delay="0"/>
+                                          </p:stCondLst>
+                                        </p:cTn>
+                                        <p:tgtEl>
+                                          <p:spTgt spid="74">
+                                            <p:txEl>
+                                              <p:pRg st="6" end="6"/>
+                                            </p:txEl>
+                                          </p:spTgt>
+                                        </p:tgtEl>
+                                        <p:attrNameLst>
+                                          <p:attrName>style.visibility</p:attrName>
+                                        </p:attrNameLst>
+                                      </p:cBhvr>
+                                      <p:to>
+                                        <p:strVal val="visible"/>
+                                      </p:to>
+                                    </p:set>
+                                    <p:animEffect transition="in" filter="fade">
+                                      <p:cBhvr>
+                                        <p:cTn id="32" dur="500"/>
+                                        <p:tgtEl>
+                                          <p:spTgt spid="74">
+                                            <p:txEl>
+                                              <p:pRg st="6" end="6"/>
+                                            </p:txEl>
+                                          </p:spTgt>
+                                        </p:tgtEl>
+                                      </p:cBhvr>
+                                    </p:animEffect>
+                                  </p:childTnLst>
+                                </p:cTn>
+                              </p:par>
+                            </p:childTnLst>
+                          </p:cTn>
+                        </p:par>
+                      </p:childTnLst>
+                    </p:cTn>
+                  </p:par>
+                  <p:par>
+                    <p:cTn id="33" fill="hold">
+                      <p:stCondLst>
+                        <p:cond delay="indefinite"/>
+                      </p:stCondLst>
+                      <p:childTnLst>
+                        <p:par>
+                          <p:cTn id="34" fill="hold">
+                            <p:stCondLst>
+                              <p:cond delay="0"/>
+                            </p:stCondLst>
+                            <p:childTnLst>
+                              <p:par>
+                                <p:cTn id="35" presetID="10" presetClass="entr" presetSubtype="0" fill="hold" nodeType="clickEffect">
+                                  <p:stCondLst>
+                                    <p:cond delay="0"/>
+                                  </p:stCondLst>
+                                  <p:childTnLst>
+                                    <p:set>
+                                      <p:cBhvr>
+                                        <p:cTn id="36" dur="1" fill="hold">
+                                          <p:stCondLst>
+                                            <p:cond delay="0"/>
+                                          </p:stCondLst>
+                                        </p:cTn>
+                                        <p:tgtEl>
+                                          <p:spTgt spid="74">
+                                            <p:txEl>
+                                              <p:pRg st="8" end="8"/>
+                                            </p:txEl>
+                                          </p:spTgt>
+                                        </p:tgtEl>
+                                        <p:attrNameLst>
+                                          <p:attrName>style.visibility</p:attrName>
+                                        </p:attrNameLst>
+                                      </p:cBhvr>
+                                      <p:to>
+                                        <p:strVal val="visible"/>
+                                      </p:to>
+                                    </p:set>
+                                    <p:animEffect transition="in" filter="fade">
+                                      <p:cBhvr>
+                                        <p:cTn id="37" dur="500"/>
+                                        <p:tgtEl>
+                                          <p:spTgt spid="74">
+                                            <p:txEl>
+                                              <p:pRg st="8" end="8"/>
+                                            </p:txEl>
+                                          </p:spTgt>
+                                        </p:tgtEl>
+                                      </p:cBhvr>
+                                    </p:animEffect>
+                                  </p:childTnLst>
+                                </p:cTn>
+                              </p:par>
+                            </p:childTnLst>
+                          </p:cTn>
+                        </p:par>
+                      </p:childTnLst>
+                    </p:cTn>
+                  </p:par>
+                </p:childTnLst>
+              </p:cTn>
+              <p:prevCondLst>
+                <p:cond evt="onPrev" delay="0">
+                  <p:tgtEl>
+                    <p:sldTgt/>
+                  </p:tgtEl>
+                </p:cond>
+              </p:prevCondLst>
+              <p:nextCondLst>
+                <p:cond evt="onNext" delay="0">
+                  <p:tgtEl>
+                    <p:sldTgt/>
+                  </p:tgtEl>
+                </p:cond>
+              </p:nextCondLst>
+            </p:seq>
+          </p:childTnLst>
+        </p:cTn>
+      </p:par>
+    </p:tnLst>
+  </p:timing>
+</p:sld>
+</file>
+
+<file path=ppt/slides/slide7.xml><?xml version="1.0" encoding="utf-8"?>
+<p:sld xmlns:a="http://schemas.openxmlformats.org/drawingml/2006/main" xmlns:r="http://schemas.openxmlformats.org/officeDocument/2006/relationships" xmlns:p="http://schemas.openxmlformats.org/presentationml/2006/main">
+  <p:cSld>
+    <p:spTree>
+      <p:nvGrpSpPr>
+        <p:cNvPr id="1" name="Shape 185"/>
+        <p:cNvGrpSpPr/>
+        <p:nvPr/>
+      </p:nvGrpSpPr>
+      <p:grpSpPr>
+        <a:xfrm>
+          <a:off x="0" y="0"/>
+          <a:ext cx="0" cy="0"/>
+          <a:chOff x="0" y="0"/>
+          <a:chExt cx="0" cy="0"/>
+        </a:xfrm>
+      </p:grpSpPr>
+      <p:sp>
+        <p:nvSpPr>
+          <p:cNvPr id="186" name="Google Shape;186;p31"/>
+          <p:cNvSpPr txBox="1">
+            <a:spLocks noGrp="1"/>
+          </p:cNvSpPr>
+          <p:nvPr>
+            <p:ph type="body" idx="1"/>
+          </p:nvPr>
+        </p:nvSpPr>
+        <p:spPr>
+          <a:xfrm>
+            <a:off x="311700" y="1280528"/>
+            <a:ext cx="8520600" cy="3795900"/>
+          </a:xfrm>
+          <a:prstGeom prst="rect">
+            <a:avLst/>
+          </a:prstGeom>
+        </p:spPr>
+        <p:txBody>
+          <a:bodyPr spcFirstLastPara="1" wrap="square" lIns="91425" tIns="91425" rIns="91425" bIns="91425" anchor="t" anchorCtr="0">
+            <a:noAutofit/>
+          </a:bodyPr>
+          <a:lstStyle/>
+          <a:p>
+            <a:pPr marL="0" lvl="0" indent="0" algn="ctr" rtl="0">
+              <a:spcBef>
+                <a:spcPts val="0"/>
+              </a:spcBef>
+              <a:spcAft>
+                <a:spcPts val="0"/>
+              </a:spcAft>
+              <a:buNone/>
+            </a:pPr>
+            <a:endParaRPr sz="2100" dirty="0"/>
+          </a:p>
+          <a:p>
+            <a:pPr marL="0" lvl="0" indent="0" algn="ctr" rtl="0">
+              <a:spcBef>
+                <a:spcPts val="1600"/>
+              </a:spcBef>
+              <a:spcAft>
+                <a:spcPts val="0"/>
+              </a:spcAft>
+              <a:buNone/>
+            </a:pPr>
+            <a:endParaRPr sz="2100" dirty="0"/>
+          </a:p>
+          <a:p>
+            <a:pPr marL="0" lvl="0" indent="0" algn="ctr" rtl="0">
+              <a:spcBef>
+                <a:spcPts val="1600"/>
+              </a:spcBef>
+              <a:spcAft>
+                <a:spcPts val="0"/>
+              </a:spcAft>
+              <a:buNone/>
+            </a:pPr>
+            <a:r>
+              <a:rPr lang="en" sz="2400" dirty="0"/>
+              <a:t>Obrigado!</a:t>
+            </a:r>
+            <a:endParaRPr sz="2400" dirty="0"/>
+          </a:p>
+          <a:p>
+            <a:pPr marL="0" lvl="0" indent="0" algn="ctr" rtl="0">
+              <a:spcBef>
+                <a:spcPts val="1600"/>
+              </a:spcBef>
+              <a:spcAft>
+                <a:spcPts val="1600"/>
+              </a:spcAft>
+              <a:buNone/>
+            </a:pPr>
+            <a:r>
+              <a:rPr lang="en" sz="2400" dirty="0"/>
+              <a:t>Dúvidas?</a:t>
+            </a:r>
+            <a:endParaRPr sz="2400" dirty="0"/>
+          </a:p>
+        </p:txBody>
+      </p:sp>
+      <p:sp>
+        <p:nvSpPr>
+          <p:cNvPr id="187" name="Google Shape;187;p31"/>
+          <p:cNvSpPr txBox="1">
+            <a:spLocks noGrp="1"/>
+          </p:cNvSpPr>
+          <p:nvPr>
+            <p:ph type="title"/>
+          </p:nvPr>
+        </p:nvSpPr>
+        <p:spPr>
+          <a:xfrm>
+            <a:off x="1143000" y="220350"/>
+            <a:ext cx="7689300" cy="636300"/>
+          </a:xfrm>
+          <a:prstGeom prst="rect">
+            <a:avLst/>
+          </a:prstGeom>
+        </p:spPr>
+        <p:txBody>
+          <a:bodyPr spcFirstLastPara="1" wrap="square" lIns="91425" tIns="91425" rIns="91425" bIns="91425" anchor="t" anchorCtr="0">
+            <a:noAutofit/>
+          </a:bodyPr>
+          <a:lstStyle/>
+          <a:p>
+            <a:pPr marL="0" lvl="0" indent="0" algn="l" rtl="0">
+              <a:spcBef>
+                <a:spcPts val="0"/>
+              </a:spcBef>
+              <a:spcAft>
+                <a:spcPts val="0"/>
+              </a:spcAft>
+              <a:buNone/>
+            </a:pPr>
+            <a:r>
+              <a:rPr lang="en"/>
+              <a:t>Conclusão</a:t>
+            </a:r>
+            <a:endParaRPr dirty="0"/>
+          </a:p>
+        </p:txBody>
+      </p:sp>
+    </p:spTree>
+  </p:cSld>
+  <p:clrMapOvr>
+    <a:masterClrMapping/>
+  </p:clrMapOvr>
+</p:sld>
+</file>
+
+<file path=ppt/slides/slide8.xml><?xml version="1.0" encoding="utf-8"?>
+<p:sld xmlns:a="http://schemas.openxmlformats.org/drawingml/2006/main" xmlns:r="http://schemas.openxmlformats.org/officeDocument/2006/relationships" xmlns:p="http://schemas.openxmlformats.org/presentationml/2006/main">
+  <p:cSld>
+    <p:spTree>
+      <p:nvGrpSpPr>
+        <p:cNvPr id="1" name="Shape 72"/>
+        <p:cNvGrpSpPr/>
+        <p:nvPr/>
+      </p:nvGrpSpPr>
+      <p:grpSpPr>
+        <a:xfrm>
+          <a:off x="0" y="0"/>
+          <a:ext cx="0" cy="0"/>
+          <a:chOff x="0" y="0"/>
+          <a:chExt cx="0" cy="0"/>
+        </a:xfrm>
+      </p:grpSpPr>
+      <p:sp>
+        <p:nvSpPr>
+          <p:cNvPr id="73" name="Google Shape;73;p14"/>
+          <p:cNvSpPr txBox="1">
+            <a:spLocks noGrp="1"/>
+          </p:cNvSpPr>
+          <p:nvPr>
+            <p:ph type="title"/>
+          </p:nvPr>
+        </p:nvSpPr>
+        <p:spPr>
+          <a:xfrm>
+            <a:off x="1143000" y="220350"/>
+            <a:ext cx="7689300" cy="636300"/>
+          </a:xfrm>
+          <a:prstGeom prst="rect">
+            <a:avLst/>
+          </a:prstGeom>
+        </p:spPr>
+        <p:txBody>
+          <a:bodyPr spcFirstLastPara="1" wrap="square" lIns="91425" tIns="91425" rIns="91425" bIns="91425" anchor="t" anchorCtr="0">
+            <a:noAutofit/>
+          </a:bodyPr>
+          <a:lstStyle/>
+          <a:p>
+            <a:pPr marL="0" lvl="0" indent="0" algn="l" rtl="0">
+              <a:spcBef>
+                <a:spcPts val="0"/>
+              </a:spcBef>
+              <a:spcAft>
+                <a:spcPts val="0"/>
+              </a:spcAft>
+              <a:buNone/>
+            </a:pPr>
+            <a:r>
+              <a:rPr lang="pt-BR" dirty="0"/>
+              <a:t>Exercício</a:t>
+            </a:r>
+            <a:endParaRPr dirty="0"/>
+          </a:p>
+        </p:txBody>
+      </p:sp>
+      <p:sp>
+        <p:nvSpPr>
+          <p:cNvPr id="74" name="Google Shape;74;p14"/>
+          <p:cNvSpPr txBox="1">
+            <a:spLocks noGrp="1"/>
+          </p:cNvSpPr>
+          <p:nvPr>
+            <p:ph type="body" idx="1"/>
+          </p:nvPr>
+        </p:nvSpPr>
+        <p:spPr>
+          <a:xfrm>
+            <a:off x="311700" y="1973178"/>
+            <a:ext cx="8520600" cy="3103249"/>
+          </a:xfrm>
+          <a:prstGeom prst="rect">
+            <a:avLst/>
+          </a:prstGeom>
+        </p:spPr>
+        <p:txBody>
+          <a:bodyPr spcFirstLastPara="1" wrap="square" lIns="91425" tIns="91425" rIns="91425" bIns="91425" numCol="2" anchor="t" anchorCtr="0">
+            <a:noAutofit/>
+          </a:bodyPr>
+          <a:lstStyle/>
+          <a:p>
+            <a:r>
+              <a:rPr lang="pt-BR" dirty="0"/>
+              <a:t>Nome completo</a:t>
+            </a:r>
+          </a:p>
+          <a:p>
+            <a:r>
+              <a:rPr lang="pt-BR" dirty="0"/>
+              <a:t>Idade</a:t>
+            </a:r>
+          </a:p>
+          <a:p>
+            <a:r>
+              <a:rPr lang="pt-BR" dirty="0"/>
+              <a:t>Gênero (list box)</a:t>
+            </a:r>
+          </a:p>
+          <a:p>
+            <a:r>
+              <a:rPr lang="pt-BR" dirty="0"/>
+              <a:t>Escolaridade (radio button)</a:t>
+            </a:r>
+          </a:p>
+          <a:p>
+            <a:r>
+              <a:rPr lang="pt-BR" dirty="0"/>
+              <a:t>Tecnologias que possui conhecimento (check box)</a:t>
+            </a:r>
+          </a:p>
+          <a:p>
+            <a:r>
+              <a:rPr lang="pt-BR" dirty="0"/>
+              <a:t>Endereço logradouro</a:t>
+            </a:r>
+          </a:p>
+          <a:p>
+            <a:endParaRPr lang="pt-BR" dirty="0"/>
+          </a:p>
+          <a:p>
+            <a:endParaRPr lang="pt-BR" dirty="0"/>
+          </a:p>
+          <a:p>
+            <a:r>
+              <a:rPr lang="pt-BR" dirty="0"/>
+              <a:t>Endereço número</a:t>
+            </a:r>
+          </a:p>
+          <a:p>
+            <a:r>
+              <a:rPr lang="pt-BR" dirty="0"/>
+              <a:t>Endereço CEP</a:t>
+            </a:r>
+          </a:p>
+          <a:p>
+            <a:r>
+              <a:rPr lang="pt-BR" dirty="0"/>
+              <a:t>Endereço cidade</a:t>
+            </a:r>
+          </a:p>
+          <a:p>
+            <a:r>
+              <a:rPr lang="pt-BR" dirty="0"/>
+              <a:t>Endereço estado (combo box)</a:t>
+            </a:r>
+          </a:p>
+          <a:p>
+            <a:r>
+              <a:rPr lang="pt-BR" dirty="0"/>
+              <a:t>E-mail</a:t>
+            </a:r>
+          </a:p>
+          <a:p>
+            <a:r>
+              <a:rPr lang="pt-BR" dirty="0"/>
+              <a:t>Senha (caracteres não visíveis)</a:t>
+            </a:r>
+          </a:p>
+          <a:p>
+            <a:r>
+              <a:rPr lang="pt-BR" dirty="0"/>
+              <a:t>Botão cadastrar (retorna mensagem “cadastro com sucesso”)</a:t>
+            </a:r>
+          </a:p>
+        </p:txBody>
+      </p:sp>
+      <p:sp>
+        <p:nvSpPr>
+          <p:cNvPr id="2" name="CaixaDeTexto 1">
+            <a:extLst>
+              <a:ext uri="{FF2B5EF4-FFF2-40B4-BE49-F238E27FC236}">
+                <a16:creationId xmlns:a16="http://schemas.microsoft.com/office/drawing/2014/main" id="{9C03A669-F526-0B93-2846-FAE3DB00B3F1}"/>
+              </a:ext>
+            </a:extLst>
+          </p:cNvPr>
+          <p:cNvSpPr txBox="1"/>
+          <p:nvPr/>
+        </p:nvSpPr>
+        <p:spPr>
+          <a:xfrm>
+            <a:off x="507539" y="1248242"/>
+            <a:ext cx="8128922" cy="646331"/>
+          </a:xfrm>
+          <a:prstGeom prst="rect">
+            <a:avLst/>
+          </a:prstGeom>
+          <a:noFill/>
+        </p:spPr>
+        <p:txBody>
+          <a:bodyPr wrap="square" rtlCol="0">
+            <a:spAutoFit/>
+          </a:bodyPr>
+          <a:lstStyle/>
+          <a:p>
+            <a:r>
+              <a:rPr kumimoji="0" lang="pt-BR" sz="1800" b="0" i="0" u="none" strike="noStrike" kern="0" cap="none" spc="0" normalizeH="0" baseline="0" noProof="0" dirty="0">
+                <a:ln>
+                  <a:noFill/>
+                </a:ln>
+                <a:solidFill>
+                  <a:srgbClr val="595959"/>
+                </a:solidFill>
+                <a:effectLst/>
+                <a:uLnTx/>
+                <a:uFillTx/>
+                <a:latin typeface="Ubuntu"/>
+                <a:sym typeface="Ubuntu"/>
+              </a:rPr>
+              <a:t>Construir uma interface em WPF para cadastro de usuários contendo os seguintes campos:</a:t>
+            </a:r>
+            <a:endParaRPr lang="pt-BR" dirty="0"/>
+          </a:p>
+        </p:txBody>
+      </p:sp>
+    </p:spTree>
+    <p:extLst>
+      <p:ext uri="{BB962C8B-B14F-4D97-AF65-F5344CB8AC3E}">
+        <p14:creationId xmlns:p14="http://schemas.microsoft.com/office/powerpoint/2010/main" val="813198678"/>
       </p:ext>
     </p:extLst>
   </p:cSld>
@@ -9935,7 +10938,7 @@
                                         <p:tgtEl>
                                           <p:spTgt spid="74">
                                             <p:txEl>
-                                              <p:pRg st="4" end="4"/>
+                                              <p:pRg st="3" end="3"/>
                                             </p:txEl>
                                           </p:spTgt>
                                         </p:tgtEl>
@@ -9953,7 +10956,7 @@
                                         <p:tgtEl>
                                           <p:spTgt spid="74">
                                             <p:txEl>
-                                              <p:pRg st="4" end="4"/>
+                                              <p:pRg st="3" end="3"/>
                                             </p:txEl>
                                           </p:spTgt>
                                         </p:tgtEl>
@@ -9978,7 +10981,7 @@
                                         <p:tgtEl>
                                           <p:spTgt spid="74">
                                             <p:txEl>
-                                              <p:pRg st="5" end="5"/>
+                                              <p:pRg st="4" end="4"/>
                                             </p:txEl>
                                           </p:spTgt>
                                         </p:tgtEl>
@@ -9996,7 +10999,7 @@
                                         <p:tgtEl>
                                           <p:spTgt spid="74">
                                             <p:txEl>
-                                              <p:pRg st="5" end="5"/>
+                                              <p:pRg st="4" end="4"/>
                                             </p:txEl>
                                           </p:spTgt>
                                         </p:tgtEl>
@@ -10021,7 +11024,7 @@
                                         <p:tgtEl>
                                           <p:spTgt spid="74">
                                             <p:txEl>
-                                              <p:pRg st="6" end="6"/>
+                                              <p:pRg st="5" end="5"/>
                                             </p:txEl>
                                           </p:spTgt>
                                         </p:tgtEl>
@@ -10039,7 +11042,7 @@
                                         <p:tgtEl>
                                           <p:spTgt spid="74">
                                             <p:txEl>
-                                              <p:pRg st="6" end="6"/>
+                                              <p:pRg st="5" end="5"/>
                                             </p:txEl>
                                           </p:spTgt>
                                         </p:tgtEl>
@@ -10091,6 +11094,264 @@
                                   </p:childTnLst>
                                 </p:cTn>
                               </p:par>
+                              <p:par>
+                                <p:cTn id="26" presetID="10" presetClass="entr" presetSubtype="0" fill="hold" nodeType="withEffect">
+                                  <p:stCondLst>
+                                    <p:cond delay="0"/>
+                                  </p:stCondLst>
+                                  <p:childTnLst>
+                                    <p:set>
+                                      <p:cBhvr>
+                                        <p:cTn id="27" dur="1" fill="hold">
+                                          <p:stCondLst>
+                                            <p:cond delay="0"/>
+                                          </p:stCondLst>
+                                        </p:cTn>
+                                        <p:tgtEl>
+                                          <p:spTgt spid="74">
+                                            <p:txEl>
+                                              <p:pRg st="9" end="9"/>
+                                            </p:txEl>
+                                          </p:spTgt>
+                                        </p:tgtEl>
+                                        <p:attrNameLst>
+                                          <p:attrName>style.visibility</p:attrName>
+                                        </p:attrNameLst>
+                                      </p:cBhvr>
+                                      <p:to>
+                                        <p:strVal val="visible"/>
+                                      </p:to>
+                                    </p:set>
+                                    <p:animEffect transition="in" filter="fade">
+                                      <p:cBhvr>
+                                        <p:cTn id="28" dur="500"/>
+                                        <p:tgtEl>
+                                          <p:spTgt spid="74">
+                                            <p:txEl>
+                                              <p:pRg st="9" end="9"/>
+                                            </p:txEl>
+                                          </p:spTgt>
+                                        </p:tgtEl>
+                                      </p:cBhvr>
+                                    </p:animEffect>
+                                  </p:childTnLst>
+                                </p:cTn>
+                              </p:par>
+                              <p:par>
+                                <p:cTn id="29" presetID="10" presetClass="entr" presetSubtype="0" fill="hold" nodeType="withEffect">
+                                  <p:stCondLst>
+                                    <p:cond delay="0"/>
+                                  </p:stCondLst>
+                                  <p:childTnLst>
+                                    <p:set>
+                                      <p:cBhvr>
+                                        <p:cTn id="30" dur="1" fill="hold">
+                                          <p:stCondLst>
+                                            <p:cond delay="0"/>
+                                          </p:stCondLst>
+                                        </p:cTn>
+                                        <p:tgtEl>
+                                          <p:spTgt spid="74">
+                                            <p:txEl>
+                                              <p:pRg st="10" end="10"/>
+                                            </p:txEl>
+                                          </p:spTgt>
+                                        </p:tgtEl>
+                                        <p:attrNameLst>
+                                          <p:attrName>style.visibility</p:attrName>
+                                        </p:attrNameLst>
+                                      </p:cBhvr>
+                                      <p:to>
+                                        <p:strVal val="visible"/>
+                                      </p:to>
+                                    </p:set>
+                                    <p:animEffect transition="in" filter="fade">
+                                      <p:cBhvr>
+                                        <p:cTn id="31" dur="500"/>
+                                        <p:tgtEl>
+                                          <p:spTgt spid="74">
+                                            <p:txEl>
+                                              <p:pRg st="10" end="10"/>
+                                            </p:txEl>
+                                          </p:spTgt>
+                                        </p:tgtEl>
+                                      </p:cBhvr>
+                                    </p:animEffect>
+                                  </p:childTnLst>
+                                </p:cTn>
+                              </p:par>
+                              <p:par>
+                                <p:cTn id="32" presetID="10" presetClass="entr" presetSubtype="0" fill="hold" nodeType="withEffect">
+                                  <p:stCondLst>
+                                    <p:cond delay="0"/>
+                                  </p:stCondLst>
+                                  <p:childTnLst>
+                                    <p:set>
+                                      <p:cBhvr>
+                                        <p:cTn id="33" dur="1" fill="hold">
+                                          <p:stCondLst>
+                                            <p:cond delay="0"/>
+                                          </p:stCondLst>
+                                        </p:cTn>
+                                        <p:tgtEl>
+                                          <p:spTgt spid="74">
+                                            <p:txEl>
+                                              <p:pRg st="11" end="11"/>
+                                            </p:txEl>
+                                          </p:spTgt>
+                                        </p:tgtEl>
+                                        <p:attrNameLst>
+                                          <p:attrName>style.visibility</p:attrName>
+                                        </p:attrNameLst>
+                                      </p:cBhvr>
+                                      <p:to>
+                                        <p:strVal val="visible"/>
+                                      </p:to>
+                                    </p:set>
+                                    <p:animEffect transition="in" filter="fade">
+                                      <p:cBhvr>
+                                        <p:cTn id="34" dur="500"/>
+                                        <p:tgtEl>
+                                          <p:spTgt spid="74">
+                                            <p:txEl>
+                                              <p:pRg st="11" end="11"/>
+                                            </p:txEl>
+                                          </p:spTgt>
+                                        </p:tgtEl>
+                                      </p:cBhvr>
+                                    </p:animEffect>
+                                  </p:childTnLst>
+                                </p:cTn>
+                              </p:par>
+                              <p:par>
+                                <p:cTn id="35" presetID="10" presetClass="entr" presetSubtype="0" fill="hold" nodeType="withEffect">
+                                  <p:stCondLst>
+                                    <p:cond delay="0"/>
+                                  </p:stCondLst>
+                                  <p:childTnLst>
+                                    <p:set>
+                                      <p:cBhvr>
+                                        <p:cTn id="36" dur="1" fill="hold">
+                                          <p:stCondLst>
+                                            <p:cond delay="0"/>
+                                          </p:stCondLst>
+                                        </p:cTn>
+                                        <p:tgtEl>
+                                          <p:spTgt spid="74">
+                                            <p:txEl>
+                                              <p:pRg st="12" end="12"/>
+                                            </p:txEl>
+                                          </p:spTgt>
+                                        </p:tgtEl>
+                                        <p:attrNameLst>
+                                          <p:attrName>style.visibility</p:attrName>
+                                        </p:attrNameLst>
+                                      </p:cBhvr>
+                                      <p:to>
+                                        <p:strVal val="visible"/>
+                                      </p:to>
+                                    </p:set>
+                                    <p:animEffect transition="in" filter="fade">
+                                      <p:cBhvr>
+                                        <p:cTn id="37" dur="500"/>
+                                        <p:tgtEl>
+                                          <p:spTgt spid="74">
+                                            <p:txEl>
+                                              <p:pRg st="12" end="12"/>
+                                            </p:txEl>
+                                          </p:spTgt>
+                                        </p:tgtEl>
+                                      </p:cBhvr>
+                                    </p:animEffect>
+                                  </p:childTnLst>
+                                </p:cTn>
+                              </p:par>
+                              <p:par>
+                                <p:cTn id="38" presetID="10" presetClass="entr" presetSubtype="0" fill="hold" nodeType="withEffect">
+                                  <p:stCondLst>
+                                    <p:cond delay="0"/>
+                                  </p:stCondLst>
+                                  <p:childTnLst>
+                                    <p:set>
+                                      <p:cBhvr>
+                                        <p:cTn id="39" dur="1" fill="hold">
+                                          <p:stCondLst>
+                                            <p:cond delay="0"/>
+                                          </p:stCondLst>
+                                        </p:cTn>
+                                        <p:tgtEl>
+                                          <p:spTgt spid="74">
+                                            <p:txEl>
+                                              <p:pRg st="13" end="13"/>
+                                            </p:txEl>
+                                          </p:spTgt>
+                                        </p:tgtEl>
+                                        <p:attrNameLst>
+                                          <p:attrName>style.visibility</p:attrName>
+                                        </p:attrNameLst>
+                                      </p:cBhvr>
+                                      <p:to>
+                                        <p:strVal val="visible"/>
+                                      </p:to>
+                                    </p:set>
+                                    <p:animEffect transition="in" filter="fade">
+                                      <p:cBhvr>
+                                        <p:cTn id="40" dur="500"/>
+                                        <p:tgtEl>
+                                          <p:spTgt spid="74">
+                                            <p:txEl>
+                                              <p:pRg st="13" end="13"/>
+                                            </p:txEl>
+                                          </p:spTgt>
+                                        </p:tgtEl>
+                                      </p:cBhvr>
+                                    </p:animEffect>
+                                  </p:childTnLst>
+                                </p:cTn>
+                              </p:par>
+                              <p:par>
+                                <p:cTn id="41" presetID="10" presetClass="entr" presetSubtype="0" fill="hold" nodeType="withEffect">
+                                  <p:stCondLst>
+                                    <p:cond delay="0"/>
+                                  </p:stCondLst>
+                                  <p:childTnLst>
+                                    <p:set>
+                                      <p:cBhvr>
+                                        <p:cTn id="42" dur="1" fill="hold">
+                                          <p:stCondLst>
+                                            <p:cond delay="0"/>
+                                          </p:stCondLst>
+                                        </p:cTn>
+                                        <p:tgtEl>
+                                          <p:spTgt spid="74">
+                                            <p:txEl>
+                                              <p:pRg st="14" end="14"/>
+                                            </p:txEl>
+                                          </p:spTgt>
+                                        </p:tgtEl>
+                                        <p:attrNameLst>
+                                          <p:attrName>style.visibility</p:attrName>
+                                        </p:attrNameLst>
+                                      </p:cBhvr>
+                                      <p:to>
+                                        <p:strVal val="visible"/>
+                                      </p:to>
+                                    </p:set>
+                                    <p:animEffect transition="in" filter="fade">
+                                      <p:cBhvr>
+                                        <p:cTn id="43" dur="500"/>
+                                        <p:tgtEl>
+                                          <p:spTgt spid="74">
+                                            <p:txEl>
+                                              <p:pRg st="14" end="14"/>
+                                            </p:txEl>
+                                          </p:spTgt>
+                                        </p:tgtEl>
+                                      </p:cBhvr>
+                                    </p:animEffect>
+                                  </p:childTnLst>
+                                </p:cTn>
+                              </p:par>
                             </p:childTnLst>
                           </p:cTn>
                         </p:par>
@@ -10119,155 +11380,6 @@
       </p:par>
     </p:tnLst>
   </p:timing>
-</p:sld>
-</file>
-
-<file path=ppt/slides/slide7.xml><?xml version="1.0" encoding="utf-8"?>
-<p:sld xmlns:a="http://schemas.openxmlformats.org/drawingml/2006/main" xmlns:r="http://schemas.openxmlformats.org/officeDocument/2006/relationships" xmlns:p="http://schemas.openxmlformats.org/presentationml/2006/main">
-  <p:cSld>
-    <p:spTree>
-      <p:nvGrpSpPr>
-        <p:cNvPr id="1" name="Shape 185"/>
-        <p:cNvGrpSpPr/>
-        <p:nvPr/>
-      </p:nvGrpSpPr>
-      <p:grpSpPr>
-        <a:xfrm>
-          <a:off x="0" y="0"/>
-          <a:ext cx="0" cy="0"/>
-          <a:chOff x="0" y="0"/>
-          <a:chExt cx="0" cy="0"/>
-        </a:xfrm>
-      </p:grpSpPr>
-      <p:sp>
-        <p:nvSpPr>
-          <p:cNvPr id="186" name="Google Shape;186;p31"/>
-          <p:cNvSpPr txBox="1">
-            <a:spLocks noGrp="1"/>
-          </p:cNvSpPr>
-          <p:nvPr>
-            <p:ph type="body" idx="1"/>
-          </p:nvPr>
-        </p:nvSpPr>
-        <p:spPr>
-          <a:xfrm>
-            <a:off x="311700" y="1280528"/>
-            <a:ext cx="8520600" cy="3795900"/>
-          </a:xfrm>
-          <a:prstGeom prst="rect">
-            <a:avLst/>
-          </a:prstGeom>
-        </p:spPr>
-        <p:txBody>
-          <a:bodyPr spcFirstLastPara="1" wrap="square" lIns="91425" tIns="91425" rIns="91425" bIns="91425" anchor="t" anchorCtr="0">
-            <a:noAutofit/>
-          </a:bodyPr>
-          <a:lstStyle/>
-          <a:p>
-            <a:pPr marL="0" lvl="0" indent="0" algn="ctr" rtl="0">
-              <a:spcBef>
-                <a:spcPts val="0"/>
-              </a:spcBef>
-              <a:spcAft>
-                <a:spcPts val="0"/>
-              </a:spcAft>
-              <a:buNone/>
-            </a:pPr>
-            <a:endParaRPr sz="2100" dirty="0"/>
-          </a:p>
-          <a:p>
-            <a:pPr marL="0" lvl="0" indent="0" algn="ctr" rtl="0">
-              <a:spcBef>
-                <a:spcPts val="1600"/>
-              </a:spcBef>
-              <a:spcAft>
-                <a:spcPts val="0"/>
-              </a:spcAft>
-              <a:buNone/>
-            </a:pPr>
-            <a:endParaRPr sz="2100" dirty="0"/>
-          </a:p>
-          <a:p>
-            <a:pPr marL="0" lvl="0" indent="0" algn="ctr" rtl="0">
-              <a:spcBef>
-                <a:spcPts val="1600"/>
-              </a:spcBef>
-              <a:spcAft>
-                <a:spcPts val="0"/>
-              </a:spcAft>
-              <a:buNone/>
-            </a:pPr>
-            <a:r>
-              <a:rPr lang="en" sz="2400" dirty="0"/>
-              <a:t>Obrigado!</a:t>
-            </a:r>
-            <a:endParaRPr sz="2400" dirty="0"/>
-          </a:p>
-          <a:p>
-            <a:pPr marL="0" lvl="0" indent="0" algn="ctr" rtl="0">
-              <a:spcBef>
-                <a:spcPts val="1600"/>
-              </a:spcBef>
-              <a:spcAft>
-                <a:spcPts val="1600"/>
-              </a:spcAft>
-              <a:buNone/>
-            </a:pPr>
-            <a:r>
-              <a:rPr lang="en" sz="2400" dirty="0"/>
-              <a:t>Dúvidas?</a:t>
-            </a:r>
-            <a:endParaRPr sz="2400" dirty="0"/>
-          </a:p>
-        </p:txBody>
-      </p:sp>
-      <p:sp>
-        <p:nvSpPr>
-          <p:cNvPr id="187" name="Google Shape;187;p31"/>
-          <p:cNvSpPr txBox="1">
-            <a:spLocks noGrp="1"/>
-          </p:cNvSpPr>
-          <p:nvPr>
-            <p:ph type="title"/>
-          </p:nvPr>
-        </p:nvSpPr>
-        <p:spPr>
-          <a:xfrm>
-            <a:off x="1143000" y="220350"/>
-            <a:ext cx="7689300" cy="636300"/>
-          </a:xfrm>
-          <a:prstGeom prst="rect">
-            <a:avLst/>
-          </a:prstGeom>
-        </p:spPr>
-        <p:txBody>
-          <a:bodyPr spcFirstLastPara="1" wrap="square" lIns="91425" tIns="91425" rIns="91425" bIns="91425" anchor="t" anchorCtr="0">
-            <a:noAutofit/>
-          </a:bodyPr>
-          <a:lstStyle/>
-          <a:p>
-            <a:pPr marL="0" lvl="0" indent="0" algn="l" rtl="0">
-              <a:spcBef>
-                <a:spcPts val="0"/>
-              </a:spcBef>
-              <a:spcAft>
-                <a:spcPts val="0"/>
-              </a:spcAft>
-              <a:buNone/>
-            </a:pPr>
-            <a:r>
-              <a:rPr lang="en"/>
-              <a:t>Conclusão</a:t>
-            </a:r>
-            <a:endParaRPr dirty="0"/>
-          </a:p>
-        </p:txBody>
-      </p:sp>
-    </p:spTree>
-  </p:cSld>
-  <p:clrMapOvr>
-    <a:masterClrMapping/>
-  </p:clrMapOvr>
 </p:sld>
 </file>
 

</xml_diff>